<commit_message>
- added: HRMViewer: show cluster/coordinator images
</commit_message>
<xml_diff>
--- a/fog.routing.hrm/icons/Icons.pptx
+++ b/fog.routing.hrm/icons/Icons.pptx
@@ -3095,411 +3095,486 @@
           <a:chExt cx="0" cy="0"/>
         </a:xfrm>
       </p:grpSpPr>
-      <p:sp>
-        <p:nvSpPr>
-          <p:cNvPr id="4" name="Ellipse 3"/>
-          <p:cNvSpPr/>
+      <p:grpSp>
+        <p:nvGrpSpPr>
+          <p:cNvPr id="2" name="Gruppieren 1"/>
+          <p:cNvGrpSpPr/>
           <p:nvPr/>
-        </p:nvSpPr>
-        <p:spPr>
+        </p:nvGrpSpPr>
+        <p:grpSpPr>
           <a:xfrm>
             <a:off x="2195736" y="1484784"/>
             <a:ext cx="576064" cy="216024"/>
+            <a:chOff x="2195736" y="1484784"/>
+            <a:chExt cx="576064" cy="216024"/>
           </a:xfrm>
-          <a:prstGeom prst="ellipse">
-            <a:avLst/>
-          </a:prstGeom>
-          <a:noFill/>
-          <a:ln w="25400">
-            <a:solidFill>
-              <a:srgbClr val="00B050"/>
-            </a:solidFill>
-          </a:ln>
-        </p:spPr>
-        <p:style>
-          <a:lnRef idx="2">
-            <a:schemeClr val="accent1">
-              <a:shade val="50000"/>
-            </a:schemeClr>
-          </a:lnRef>
-          <a:fillRef idx="1">
-            <a:schemeClr val="accent1"/>
-          </a:fillRef>
-          <a:effectRef idx="0">
-            <a:schemeClr val="accent1"/>
-          </a:effectRef>
-          <a:fontRef idx="minor">
-            <a:schemeClr val="lt1"/>
-          </a:fontRef>
-        </p:style>
-        <p:txBody>
-          <a:bodyPr rtlCol="0" anchor="ctr"/>
-          <a:lstStyle/>
-          <a:p>
-            <a:pPr algn="ctr"/>
-            <a:endParaRPr lang="de-DE" b="1">
+        </p:grpSpPr>
+        <p:sp>
+          <p:nvSpPr>
+            <p:cNvPr id="4" name="Ellipse 3"/>
+            <p:cNvSpPr/>
+            <p:nvPr/>
+          </p:nvSpPr>
+          <p:spPr>
+            <a:xfrm>
+              <a:off x="2195736" y="1484784"/>
+              <a:ext cx="576064" cy="216024"/>
+            </a:xfrm>
+            <a:prstGeom prst="ellipse">
+              <a:avLst/>
+            </a:prstGeom>
+            <a:noFill/>
+            <a:ln w="25400">
               <a:solidFill>
-                <a:schemeClr val="tx1"/>
+                <a:srgbClr val="00B050"/>
               </a:solidFill>
-            </a:endParaRPr>
-          </a:p>
-        </p:txBody>
-      </p:sp>
-      <p:sp>
-        <p:nvSpPr>
-          <p:cNvPr id="5" name="Textfeld 4"/>
-          <p:cNvSpPr txBox="1"/>
+            </a:ln>
+          </p:spPr>
+          <p:style>
+            <a:lnRef idx="2">
+              <a:schemeClr val="accent1">
+                <a:shade val="50000"/>
+              </a:schemeClr>
+            </a:lnRef>
+            <a:fillRef idx="1">
+              <a:schemeClr val="accent1"/>
+            </a:fillRef>
+            <a:effectRef idx="0">
+              <a:schemeClr val="accent1"/>
+            </a:effectRef>
+            <a:fontRef idx="minor">
+              <a:schemeClr val="lt1"/>
+            </a:fontRef>
+          </p:style>
+          <p:txBody>
+            <a:bodyPr rtlCol="0" anchor="ctr"/>
+            <a:lstStyle/>
+            <a:p>
+              <a:pPr algn="ctr"/>
+              <a:endParaRPr lang="de-DE" b="1">
+                <a:solidFill>
+                  <a:schemeClr val="tx1"/>
+                </a:solidFill>
+              </a:endParaRPr>
+            </a:p>
+          </p:txBody>
+        </p:sp>
+        <p:sp>
+          <p:nvSpPr>
+            <p:cNvPr id="5" name="Textfeld 4"/>
+            <p:cNvSpPr txBox="1"/>
+            <p:nvPr/>
+          </p:nvSpPr>
+          <p:spPr>
+            <a:xfrm>
+              <a:off x="2411760" y="1484784"/>
+              <a:ext cx="144016" cy="216024"/>
+            </a:xfrm>
+            <a:prstGeom prst="rect">
+              <a:avLst/>
+            </a:prstGeom>
+            <a:noFill/>
+          </p:spPr>
+          <p:txBody>
+            <a:bodyPr wrap="square" rtlCol="0" anchor="ctr" anchorCtr="0">
+              <a:noAutofit/>
+            </a:bodyPr>
+            <a:lstStyle/>
+            <a:p>
+              <a:pPr algn="ctr"/>
+              <a:r>
+                <a:rPr lang="de-DE" sz="2000" b="1" dirty="0" smtClean="0"/>
+                <a:t>0</a:t>
+              </a:r>
+              <a:endParaRPr lang="de-DE" sz="2000" b="1" dirty="0"/>
+            </a:p>
+          </p:txBody>
+        </p:sp>
+      </p:grpSp>
+      <p:grpSp>
+        <p:nvGrpSpPr>
+          <p:cNvPr id="3" name="Gruppieren 2"/>
+          <p:cNvGrpSpPr/>
           <p:nvPr/>
-        </p:nvSpPr>
-        <p:spPr>
-          <a:xfrm>
-            <a:off x="2411760" y="1484784"/>
-            <a:ext cx="144016" cy="216024"/>
-          </a:xfrm>
-          <a:prstGeom prst="rect">
-            <a:avLst/>
-          </a:prstGeom>
-          <a:noFill/>
-        </p:spPr>
-        <p:txBody>
-          <a:bodyPr wrap="square" rtlCol="0" anchor="ctr" anchorCtr="0">
-            <a:noAutofit/>
-          </a:bodyPr>
-          <a:lstStyle/>
-          <a:p>
-            <a:pPr algn="ctr"/>
-            <a:r>
-              <a:rPr lang="de-DE" sz="2000" b="1" dirty="0" smtClean="0"/>
-              <a:t>0</a:t>
-            </a:r>
-            <a:endParaRPr lang="de-DE" sz="2000" b="1" dirty="0"/>
-          </a:p>
-        </p:txBody>
-      </p:sp>
-      <p:sp>
-        <p:nvSpPr>
-          <p:cNvPr id="6" name="Ellipse 5"/>
-          <p:cNvSpPr/>
-          <p:nvPr/>
-        </p:nvSpPr>
-        <p:spPr>
+        </p:nvGrpSpPr>
+        <p:grpSpPr>
           <a:xfrm>
             <a:off x="2267744" y="2060848"/>
             <a:ext cx="576064" cy="216024"/>
+            <a:chOff x="2267744" y="2060848"/>
+            <a:chExt cx="576064" cy="216024"/>
           </a:xfrm>
-          <a:prstGeom prst="ellipse">
-            <a:avLst/>
-          </a:prstGeom>
-          <a:noFill/>
-          <a:ln w="25400">
-            <a:solidFill>
-              <a:srgbClr val="00B050"/>
-            </a:solidFill>
-          </a:ln>
-        </p:spPr>
-        <p:style>
-          <a:lnRef idx="2">
-            <a:schemeClr val="accent1">
-              <a:shade val="50000"/>
-            </a:schemeClr>
-          </a:lnRef>
-          <a:fillRef idx="1">
-            <a:schemeClr val="accent1"/>
-          </a:fillRef>
-          <a:effectRef idx="0">
-            <a:schemeClr val="accent1"/>
-          </a:effectRef>
-          <a:fontRef idx="minor">
-            <a:schemeClr val="lt1"/>
-          </a:fontRef>
-        </p:style>
-        <p:txBody>
-          <a:bodyPr rtlCol="0" anchor="ctr"/>
-          <a:lstStyle/>
-          <a:p>
-            <a:pPr algn="ctr"/>
-            <a:endParaRPr lang="de-DE" b="1">
+        </p:grpSpPr>
+        <p:sp>
+          <p:nvSpPr>
+            <p:cNvPr id="6" name="Ellipse 5"/>
+            <p:cNvSpPr/>
+            <p:nvPr/>
+          </p:nvSpPr>
+          <p:spPr>
+            <a:xfrm>
+              <a:off x="2267744" y="2060848"/>
+              <a:ext cx="576064" cy="216024"/>
+            </a:xfrm>
+            <a:prstGeom prst="ellipse">
+              <a:avLst/>
+            </a:prstGeom>
+            <a:noFill/>
+            <a:ln w="25400">
               <a:solidFill>
-                <a:schemeClr val="tx1"/>
+                <a:srgbClr val="00B050"/>
               </a:solidFill>
-            </a:endParaRPr>
-          </a:p>
-        </p:txBody>
-      </p:sp>
-      <p:sp>
-        <p:nvSpPr>
-          <p:cNvPr id="7" name="Textfeld 6"/>
-          <p:cNvSpPr txBox="1"/>
+            </a:ln>
+          </p:spPr>
+          <p:style>
+            <a:lnRef idx="2">
+              <a:schemeClr val="accent1">
+                <a:shade val="50000"/>
+              </a:schemeClr>
+            </a:lnRef>
+            <a:fillRef idx="1">
+              <a:schemeClr val="accent1"/>
+            </a:fillRef>
+            <a:effectRef idx="0">
+              <a:schemeClr val="accent1"/>
+            </a:effectRef>
+            <a:fontRef idx="minor">
+              <a:schemeClr val="lt1"/>
+            </a:fontRef>
+          </p:style>
+          <p:txBody>
+            <a:bodyPr rtlCol="0" anchor="ctr"/>
+            <a:lstStyle/>
+            <a:p>
+              <a:pPr algn="ctr"/>
+              <a:endParaRPr lang="de-DE" b="1">
+                <a:solidFill>
+                  <a:schemeClr val="tx1"/>
+                </a:solidFill>
+              </a:endParaRPr>
+            </a:p>
+          </p:txBody>
+        </p:sp>
+        <p:sp>
+          <p:nvSpPr>
+            <p:cNvPr id="7" name="Textfeld 6"/>
+            <p:cNvSpPr txBox="1"/>
+            <p:nvPr/>
+          </p:nvSpPr>
+          <p:spPr>
+            <a:xfrm>
+              <a:off x="2483768" y="2060848"/>
+              <a:ext cx="144016" cy="216024"/>
+            </a:xfrm>
+            <a:prstGeom prst="rect">
+              <a:avLst/>
+            </a:prstGeom>
+            <a:noFill/>
+          </p:spPr>
+          <p:txBody>
+            <a:bodyPr wrap="square" rtlCol="0" anchor="ctr" anchorCtr="0">
+              <a:noAutofit/>
+            </a:bodyPr>
+            <a:lstStyle/>
+            <a:p>
+              <a:pPr algn="ctr"/>
+              <a:r>
+                <a:rPr lang="de-DE" sz="2000" b="1" dirty="0" smtClean="0"/>
+                <a:t>1</a:t>
+              </a:r>
+              <a:endParaRPr lang="de-DE" sz="2000" b="1" dirty="0"/>
+            </a:p>
+          </p:txBody>
+        </p:sp>
+      </p:grpSp>
+      <p:grpSp>
+        <p:nvGrpSpPr>
+          <p:cNvPr id="14" name="Gruppieren 13"/>
+          <p:cNvGrpSpPr/>
           <p:nvPr/>
-        </p:nvSpPr>
-        <p:spPr>
-          <a:xfrm>
-            <a:off x="2483768" y="2060848"/>
-            <a:ext cx="144016" cy="216024"/>
-          </a:xfrm>
-          <a:prstGeom prst="rect">
-            <a:avLst/>
-          </a:prstGeom>
-          <a:noFill/>
-        </p:spPr>
-        <p:txBody>
-          <a:bodyPr wrap="square" rtlCol="0" anchor="ctr" anchorCtr="0">
-            <a:noAutofit/>
-          </a:bodyPr>
-          <a:lstStyle/>
-          <a:p>
-            <a:pPr algn="ctr"/>
-            <a:r>
-              <a:rPr lang="de-DE" sz="2000" b="1" dirty="0" smtClean="0"/>
-              <a:t>1</a:t>
-            </a:r>
-            <a:endParaRPr lang="de-DE" sz="2000" b="1" dirty="0"/>
-          </a:p>
-        </p:txBody>
-      </p:sp>
-      <p:sp>
-        <p:nvSpPr>
-          <p:cNvPr id="8" name="Ellipse 7"/>
-          <p:cNvSpPr/>
-          <p:nvPr/>
-        </p:nvSpPr>
-        <p:spPr>
+        </p:nvGrpSpPr>
+        <p:grpSpPr>
           <a:xfrm>
             <a:off x="2555776" y="2631584"/>
             <a:ext cx="576064" cy="216024"/>
+            <a:chOff x="2555776" y="2631584"/>
+            <a:chExt cx="576064" cy="216024"/>
           </a:xfrm>
-          <a:prstGeom prst="ellipse">
-            <a:avLst/>
-          </a:prstGeom>
-          <a:noFill/>
-          <a:ln w="25400">
-            <a:solidFill>
-              <a:srgbClr val="00B050"/>
-            </a:solidFill>
-          </a:ln>
-        </p:spPr>
-        <p:style>
-          <a:lnRef idx="2">
-            <a:schemeClr val="accent1">
-              <a:shade val="50000"/>
-            </a:schemeClr>
-          </a:lnRef>
-          <a:fillRef idx="1">
-            <a:schemeClr val="accent1"/>
-          </a:fillRef>
-          <a:effectRef idx="0">
-            <a:schemeClr val="accent1"/>
-          </a:effectRef>
-          <a:fontRef idx="minor">
-            <a:schemeClr val="lt1"/>
-          </a:fontRef>
-        </p:style>
-        <p:txBody>
-          <a:bodyPr rtlCol="0" anchor="ctr"/>
-          <a:lstStyle/>
-          <a:p>
-            <a:pPr algn="ctr"/>
-            <a:endParaRPr lang="de-DE" b="1">
+        </p:grpSpPr>
+        <p:sp>
+          <p:nvSpPr>
+            <p:cNvPr id="8" name="Ellipse 7"/>
+            <p:cNvSpPr/>
+            <p:nvPr/>
+          </p:nvSpPr>
+          <p:spPr>
+            <a:xfrm>
+              <a:off x="2555776" y="2631584"/>
+              <a:ext cx="576064" cy="216024"/>
+            </a:xfrm>
+            <a:prstGeom prst="ellipse">
+              <a:avLst/>
+            </a:prstGeom>
+            <a:noFill/>
+            <a:ln w="25400">
               <a:solidFill>
-                <a:schemeClr val="tx1"/>
+                <a:srgbClr val="00B050"/>
               </a:solidFill>
-            </a:endParaRPr>
-          </a:p>
-        </p:txBody>
-      </p:sp>
-      <p:sp>
-        <p:nvSpPr>
-          <p:cNvPr id="9" name="Textfeld 8"/>
-          <p:cNvSpPr txBox="1"/>
+            </a:ln>
+          </p:spPr>
+          <p:style>
+            <a:lnRef idx="2">
+              <a:schemeClr val="accent1">
+                <a:shade val="50000"/>
+              </a:schemeClr>
+            </a:lnRef>
+            <a:fillRef idx="1">
+              <a:schemeClr val="accent1"/>
+            </a:fillRef>
+            <a:effectRef idx="0">
+              <a:schemeClr val="accent1"/>
+            </a:effectRef>
+            <a:fontRef idx="minor">
+              <a:schemeClr val="lt1"/>
+            </a:fontRef>
+          </p:style>
+          <p:txBody>
+            <a:bodyPr rtlCol="0" anchor="ctr"/>
+            <a:lstStyle/>
+            <a:p>
+              <a:pPr algn="ctr"/>
+              <a:endParaRPr lang="de-DE" b="1">
+                <a:solidFill>
+                  <a:schemeClr val="tx1"/>
+                </a:solidFill>
+              </a:endParaRPr>
+            </a:p>
+          </p:txBody>
+        </p:sp>
+        <p:sp>
+          <p:nvSpPr>
+            <p:cNvPr id="9" name="Textfeld 8"/>
+            <p:cNvSpPr txBox="1"/>
+            <p:nvPr/>
+          </p:nvSpPr>
+          <p:spPr>
+            <a:xfrm>
+              <a:off x="2771800" y="2631584"/>
+              <a:ext cx="144016" cy="216024"/>
+            </a:xfrm>
+            <a:prstGeom prst="rect">
+              <a:avLst/>
+            </a:prstGeom>
+            <a:noFill/>
+          </p:spPr>
+          <p:txBody>
+            <a:bodyPr wrap="square" rtlCol="0" anchor="ctr" anchorCtr="0">
+              <a:noAutofit/>
+            </a:bodyPr>
+            <a:lstStyle/>
+            <a:p>
+              <a:pPr algn="ctr"/>
+              <a:r>
+                <a:rPr lang="de-DE" sz="2000" b="1" dirty="0" smtClean="0"/>
+                <a:t>2</a:t>
+              </a:r>
+              <a:endParaRPr lang="de-DE" sz="2000" b="1" dirty="0"/>
+            </a:p>
+          </p:txBody>
+        </p:sp>
+      </p:grpSp>
+      <p:grpSp>
+        <p:nvGrpSpPr>
+          <p:cNvPr id="15" name="Gruppieren 14"/>
+          <p:cNvGrpSpPr/>
           <p:nvPr/>
-        </p:nvSpPr>
-        <p:spPr>
-          <a:xfrm>
-            <a:off x="2771800" y="2631584"/>
-            <a:ext cx="144016" cy="216024"/>
-          </a:xfrm>
-          <a:prstGeom prst="rect">
-            <a:avLst/>
-          </a:prstGeom>
-          <a:noFill/>
-        </p:spPr>
-        <p:txBody>
-          <a:bodyPr wrap="square" rtlCol="0" anchor="ctr" anchorCtr="0">
-            <a:noAutofit/>
-          </a:bodyPr>
-          <a:lstStyle/>
-          <a:p>
-            <a:pPr algn="ctr"/>
-            <a:r>
-              <a:rPr lang="de-DE" sz="2000" b="1" dirty="0" smtClean="0"/>
-              <a:t>2</a:t>
-            </a:r>
-            <a:endParaRPr lang="de-DE" sz="2000" b="1" dirty="0"/>
-          </a:p>
-        </p:txBody>
-      </p:sp>
-      <p:sp>
-        <p:nvSpPr>
-          <p:cNvPr id="10" name="Ellipse 9"/>
-          <p:cNvSpPr/>
-          <p:nvPr/>
-        </p:nvSpPr>
-        <p:spPr>
+        </p:nvGrpSpPr>
+        <p:grpSpPr>
           <a:xfrm>
             <a:off x="2492152" y="3356992"/>
             <a:ext cx="576064" cy="216024"/>
+            <a:chOff x="2492152" y="3356992"/>
+            <a:chExt cx="576064" cy="216024"/>
           </a:xfrm>
-          <a:prstGeom prst="ellipse">
-            <a:avLst/>
-          </a:prstGeom>
-          <a:noFill/>
-          <a:ln w="25400">
-            <a:solidFill>
-              <a:srgbClr val="00B050"/>
-            </a:solidFill>
-          </a:ln>
-        </p:spPr>
-        <p:style>
-          <a:lnRef idx="2">
-            <a:schemeClr val="accent1">
-              <a:shade val="50000"/>
-            </a:schemeClr>
-          </a:lnRef>
-          <a:fillRef idx="1">
-            <a:schemeClr val="accent1"/>
-          </a:fillRef>
-          <a:effectRef idx="0">
-            <a:schemeClr val="accent1"/>
-          </a:effectRef>
-          <a:fontRef idx="minor">
-            <a:schemeClr val="lt1"/>
-          </a:fontRef>
-        </p:style>
-        <p:txBody>
-          <a:bodyPr rtlCol="0" anchor="ctr"/>
-          <a:lstStyle/>
-          <a:p>
-            <a:pPr algn="ctr"/>
-            <a:endParaRPr lang="de-DE" b="1">
+        </p:grpSpPr>
+        <p:sp>
+          <p:nvSpPr>
+            <p:cNvPr id="10" name="Ellipse 9"/>
+            <p:cNvSpPr/>
+            <p:nvPr/>
+          </p:nvSpPr>
+          <p:spPr>
+            <a:xfrm>
+              <a:off x="2492152" y="3356992"/>
+              <a:ext cx="576064" cy="216024"/>
+            </a:xfrm>
+            <a:prstGeom prst="ellipse">
+              <a:avLst/>
+            </a:prstGeom>
+            <a:noFill/>
+            <a:ln w="25400">
               <a:solidFill>
-                <a:schemeClr val="tx1"/>
+                <a:srgbClr val="00B050"/>
               </a:solidFill>
-            </a:endParaRPr>
-          </a:p>
-        </p:txBody>
-      </p:sp>
-      <p:sp>
-        <p:nvSpPr>
-          <p:cNvPr id="11" name="Textfeld 10"/>
-          <p:cNvSpPr txBox="1"/>
+            </a:ln>
+          </p:spPr>
+          <p:style>
+            <a:lnRef idx="2">
+              <a:schemeClr val="accent1">
+                <a:shade val="50000"/>
+              </a:schemeClr>
+            </a:lnRef>
+            <a:fillRef idx="1">
+              <a:schemeClr val="accent1"/>
+            </a:fillRef>
+            <a:effectRef idx="0">
+              <a:schemeClr val="accent1"/>
+            </a:effectRef>
+            <a:fontRef idx="minor">
+              <a:schemeClr val="lt1"/>
+            </a:fontRef>
+          </p:style>
+          <p:txBody>
+            <a:bodyPr rtlCol="0" anchor="ctr"/>
+            <a:lstStyle/>
+            <a:p>
+              <a:pPr algn="ctr"/>
+              <a:endParaRPr lang="de-DE" b="1">
+                <a:solidFill>
+                  <a:schemeClr val="tx1"/>
+                </a:solidFill>
+              </a:endParaRPr>
+            </a:p>
+          </p:txBody>
+        </p:sp>
+        <p:sp>
+          <p:nvSpPr>
+            <p:cNvPr id="11" name="Textfeld 10"/>
+            <p:cNvSpPr txBox="1"/>
+            <p:nvPr/>
+          </p:nvSpPr>
+          <p:spPr>
+            <a:xfrm>
+              <a:off x="2708176" y="3356992"/>
+              <a:ext cx="144016" cy="216024"/>
+            </a:xfrm>
+            <a:prstGeom prst="rect">
+              <a:avLst/>
+            </a:prstGeom>
+            <a:noFill/>
+          </p:spPr>
+          <p:txBody>
+            <a:bodyPr wrap="square" rtlCol="0" anchor="ctr" anchorCtr="0">
+              <a:noAutofit/>
+            </a:bodyPr>
+            <a:lstStyle/>
+            <a:p>
+              <a:pPr algn="ctr"/>
+              <a:r>
+                <a:rPr lang="de-DE" sz="2000" b="1" dirty="0" smtClean="0"/>
+                <a:t>3</a:t>
+              </a:r>
+              <a:endParaRPr lang="de-DE" sz="2000" b="1" dirty="0"/>
+            </a:p>
+          </p:txBody>
+        </p:sp>
+      </p:grpSp>
+      <p:grpSp>
+        <p:nvGrpSpPr>
+          <p:cNvPr id="16" name="Gruppieren 15"/>
+          <p:cNvGrpSpPr/>
           <p:nvPr/>
-        </p:nvSpPr>
-        <p:spPr>
-          <a:xfrm>
-            <a:off x="2708176" y="3356992"/>
-            <a:ext cx="144016" cy="216024"/>
-          </a:xfrm>
-          <a:prstGeom prst="rect">
-            <a:avLst/>
-          </a:prstGeom>
-          <a:noFill/>
-        </p:spPr>
-        <p:txBody>
-          <a:bodyPr wrap="square" rtlCol="0" anchor="ctr" anchorCtr="0">
-            <a:noAutofit/>
-          </a:bodyPr>
-          <a:lstStyle/>
-          <a:p>
-            <a:pPr algn="ctr"/>
-            <a:r>
-              <a:rPr lang="de-DE" sz="2000" b="1" dirty="0" smtClean="0"/>
-              <a:t>3</a:t>
-            </a:r>
-            <a:endParaRPr lang="de-DE" sz="2000" b="1" dirty="0"/>
-          </a:p>
-        </p:txBody>
-      </p:sp>
-      <p:sp>
-        <p:nvSpPr>
-          <p:cNvPr id="12" name="Ellipse 11"/>
-          <p:cNvSpPr/>
-          <p:nvPr/>
-        </p:nvSpPr>
-        <p:spPr>
+        </p:nvGrpSpPr>
+        <p:grpSpPr>
           <a:xfrm>
             <a:off x="2428528" y="4005064"/>
             <a:ext cx="576064" cy="216024"/>
+            <a:chOff x="2428528" y="4005064"/>
+            <a:chExt cx="576064" cy="216024"/>
           </a:xfrm>
-          <a:prstGeom prst="ellipse">
-            <a:avLst/>
-          </a:prstGeom>
-          <a:noFill/>
-          <a:ln w="25400">
-            <a:solidFill>
-              <a:srgbClr val="00B050"/>
-            </a:solidFill>
-          </a:ln>
-        </p:spPr>
-        <p:style>
-          <a:lnRef idx="2">
-            <a:schemeClr val="accent1">
-              <a:shade val="50000"/>
-            </a:schemeClr>
-          </a:lnRef>
-          <a:fillRef idx="1">
-            <a:schemeClr val="accent1"/>
-          </a:fillRef>
-          <a:effectRef idx="0">
-            <a:schemeClr val="accent1"/>
-          </a:effectRef>
-          <a:fontRef idx="minor">
-            <a:schemeClr val="lt1"/>
-          </a:fontRef>
-        </p:style>
-        <p:txBody>
-          <a:bodyPr rtlCol="0" anchor="ctr"/>
-          <a:lstStyle/>
-          <a:p>
-            <a:pPr algn="ctr"/>
-            <a:endParaRPr lang="de-DE" b="1">
+        </p:grpSpPr>
+        <p:sp>
+          <p:nvSpPr>
+            <p:cNvPr id="12" name="Ellipse 11"/>
+            <p:cNvSpPr/>
+            <p:nvPr/>
+          </p:nvSpPr>
+          <p:spPr>
+            <a:xfrm>
+              <a:off x="2428528" y="4005064"/>
+              <a:ext cx="576064" cy="216024"/>
+            </a:xfrm>
+            <a:prstGeom prst="ellipse">
+              <a:avLst/>
+            </a:prstGeom>
+            <a:noFill/>
+            <a:ln w="25400">
               <a:solidFill>
-                <a:schemeClr val="tx1"/>
+                <a:srgbClr val="00B050"/>
               </a:solidFill>
-            </a:endParaRPr>
-          </a:p>
-        </p:txBody>
-      </p:sp>
-      <p:sp>
-        <p:nvSpPr>
-          <p:cNvPr id="13" name="Textfeld 12"/>
-          <p:cNvSpPr txBox="1"/>
-          <p:nvPr/>
-        </p:nvSpPr>
-        <p:spPr>
-          <a:xfrm>
-            <a:off x="2644552" y="4005064"/>
-            <a:ext cx="144016" cy="216024"/>
-          </a:xfrm>
-          <a:prstGeom prst="rect">
-            <a:avLst/>
-          </a:prstGeom>
-          <a:noFill/>
-        </p:spPr>
-        <p:txBody>
-          <a:bodyPr wrap="square" rtlCol="0" anchor="ctr" anchorCtr="0">
-            <a:noAutofit/>
-          </a:bodyPr>
-          <a:lstStyle/>
-          <a:p>
-            <a:pPr algn="ctr"/>
-            <a:r>
-              <a:rPr lang="de-DE" sz="2000" b="1" dirty="0" smtClean="0"/>
-              <a:t>4</a:t>
-            </a:r>
-            <a:endParaRPr lang="de-DE" sz="2000" b="1" dirty="0"/>
-          </a:p>
-        </p:txBody>
-      </p:sp>
+            </a:ln>
+          </p:spPr>
+          <p:style>
+            <a:lnRef idx="2">
+              <a:schemeClr val="accent1">
+                <a:shade val="50000"/>
+              </a:schemeClr>
+            </a:lnRef>
+            <a:fillRef idx="1">
+              <a:schemeClr val="accent1"/>
+            </a:fillRef>
+            <a:effectRef idx="0">
+              <a:schemeClr val="accent1"/>
+            </a:effectRef>
+            <a:fontRef idx="minor">
+              <a:schemeClr val="lt1"/>
+            </a:fontRef>
+          </p:style>
+          <p:txBody>
+            <a:bodyPr rtlCol="0" anchor="ctr"/>
+            <a:lstStyle/>
+            <a:p>
+              <a:pPr algn="ctr"/>
+              <a:endParaRPr lang="de-DE" b="1">
+                <a:solidFill>
+                  <a:schemeClr val="tx1"/>
+                </a:solidFill>
+              </a:endParaRPr>
+            </a:p>
+          </p:txBody>
+        </p:sp>
+        <p:sp>
+          <p:nvSpPr>
+            <p:cNvPr id="13" name="Textfeld 12"/>
+            <p:cNvSpPr txBox="1"/>
+            <p:nvPr/>
+          </p:nvSpPr>
+          <p:spPr>
+            <a:xfrm>
+              <a:off x="2644552" y="4005064"/>
+              <a:ext cx="144016" cy="216024"/>
+            </a:xfrm>
+            <a:prstGeom prst="rect">
+              <a:avLst/>
+            </a:prstGeom>
+            <a:noFill/>
+          </p:spPr>
+          <p:txBody>
+            <a:bodyPr wrap="square" rtlCol="0" anchor="ctr" anchorCtr="0">
+              <a:noAutofit/>
+            </a:bodyPr>
+            <a:lstStyle/>
+            <a:p>
+              <a:pPr algn="ctr"/>
+              <a:r>
+                <a:rPr lang="de-DE" sz="2000" b="1" dirty="0" smtClean="0"/>
+                <a:t>4</a:t>
+              </a:r>
+              <a:endParaRPr lang="de-DE" sz="2000" b="1" dirty="0"/>
+            </a:p>
+          </p:txBody>
+        </p:sp>
+      </p:grpSp>
     </p:spTree>
     <p:extLst>
       <p:ext uri="{BB962C8B-B14F-4D97-AF65-F5344CB8AC3E}">

</xml_diff>